<commit_message>
Update Generative AI for East Asian Studies_use cases.pptx
</commit_message>
<xml_diff>
--- a/_slides/Generative AI for East Asian Studies_use cases.pptx
+++ b/_slides/Generative AI for East Asian Studies_use cases.pptx
@@ -516,7 +516,7 @@
           <a:p>
             <a:fld id="{AF54A7A0-DFCC-41AE-90DB-6C15F128ED63}" type="datetimeFigureOut">
               <a:rPr lang="en-US" smtClean="0"/>
-              <a:t>4/13/2023</a:t>
+              <a:t>4/14/2023</a:t>
             </a:fld>
             <a:endParaRPr lang="en-US"/>
           </a:p>
@@ -714,7 +714,7 @@
           <a:p>
             <a:fld id="{AF54A7A0-DFCC-41AE-90DB-6C15F128ED63}" type="datetimeFigureOut">
               <a:rPr lang="en-US" smtClean="0"/>
-              <a:t>4/13/2023</a:t>
+              <a:t>4/14/2023</a:t>
             </a:fld>
             <a:endParaRPr lang="en-US"/>
           </a:p>
@@ -922,7 +922,7 @@
           <a:p>
             <a:fld id="{AF54A7A0-DFCC-41AE-90DB-6C15F128ED63}" type="datetimeFigureOut">
               <a:rPr lang="en-US" smtClean="0"/>
-              <a:t>4/13/2023</a:t>
+              <a:t>4/14/2023</a:t>
             </a:fld>
             <a:endParaRPr lang="en-US"/>
           </a:p>
@@ -1120,7 +1120,7 @@
           <a:p>
             <a:fld id="{AF54A7A0-DFCC-41AE-90DB-6C15F128ED63}" type="datetimeFigureOut">
               <a:rPr lang="en-US" smtClean="0"/>
-              <a:t>4/13/2023</a:t>
+              <a:t>4/14/2023</a:t>
             </a:fld>
             <a:endParaRPr lang="en-US"/>
           </a:p>
@@ -1395,7 +1395,7 @@
           <a:p>
             <a:fld id="{AF54A7A0-DFCC-41AE-90DB-6C15F128ED63}" type="datetimeFigureOut">
               <a:rPr lang="en-US" smtClean="0"/>
-              <a:t>4/13/2023</a:t>
+              <a:t>4/14/2023</a:t>
             </a:fld>
             <a:endParaRPr lang="en-US"/>
           </a:p>
@@ -1660,7 +1660,7 @@
           <a:p>
             <a:fld id="{AF54A7A0-DFCC-41AE-90DB-6C15F128ED63}" type="datetimeFigureOut">
               <a:rPr lang="en-US" smtClean="0"/>
-              <a:t>4/13/2023</a:t>
+              <a:t>4/14/2023</a:t>
             </a:fld>
             <a:endParaRPr lang="en-US"/>
           </a:p>
@@ -2072,7 +2072,7 @@
           <a:p>
             <a:fld id="{AF54A7A0-DFCC-41AE-90DB-6C15F128ED63}" type="datetimeFigureOut">
               <a:rPr lang="en-US" smtClean="0"/>
-              <a:t>4/13/2023</a:t>
+              <a:t>4/14/2023</a:t>
             </a:fld>
             <a:endParaRPr lang="en-US"/>
           </a:p>
@@ -2213,7 +2213,7 @@
           <a:p>
             <a:fld id="{AF54A7A0-DFCC-41AE-90DB-6C15F128ED63}" type="datetimeFigureOut">
               <a:rPr lang="en-US" smtClean="0"/>
-              <a:t>4/13/2023</a:t>
+              <a:t>4/14/2023</a:t>
             </a:fld>
             <a:endParaRPr lang="en-US"/>
           </a:p>
@@ -2326,7 +2326,7 @@
           <a:p>
             <a:fld id="{AF54A7A0-DFCC-41AE-90DB-6C15F128ED63}" type="datetimeFigureOut">
               <a:rPr lang="en-US" smtClean="0"/>
-              <a:t>4/13/2023</a:t>
+              <a:t>4/14/2023</a:t>
             </a:fld>
             <a:endParaRPr lang="en-US"/>
           </a:p>
@@ -2637,7 +2637,7 @@
           <a:p>
             <a:fld id="{AF54A7A0-DFCC-41AE-90DB-6C15F128ED63}" type="datetimeFigureOut">
               <a:rPr lang="en-US" smtClean="0"/>
-              <a:t>4/13/2023</a:t>
+              <a:t>4/14/2023</a:t>
             </a:fld>
             <a:endParaRPr lang="en-US"/>
           </a:p>
@@ -2925,7 +2925,7 @@
           <a:p>
             <a:fld id="{AF54A7A0-DFCC-41AE-90DB-6C15F128ED63}" type="datetimeFigureOut">
               <a:rPr lang="en-US" smtClean="0"/>
-              <a:t>4/13/2023</a:t>
+              <a:t>4/14/2023</a:t>
             </a:fld>
             <a:endParaRPr lang="en-US"/>
           </a:p>
@@ -3166,7 +3166,7 @@
           <a:p>
             <a:fld id="{AF54A7A0-DFCC-41AE-90DB-6C15F128ED63}" type="datetimeFigureOut">
               <a:rPr lang="en-US" smtClean="0"/>
-              <a:t>4/13/2023</a:t>
+              <a:t>4/14/2023</a:t>
             </a:fld>
             <a:endParaRPr lang="en-US"/>
           </a:p>
@@ -3639,10 +3639,7 @@
           <a:bodyPr/>
           <a:lstStyle/>
           <a:p>
-            <a:r>
-              <a:rPr lang="en-US" dirty="0"/>
-              <a:t>Hongsu Wang</a:t>
-            </a:r>
+            <a:endParaRPr lang="en-US" dirty="0"/>
           </a:p>
         </p:txBody>
       </p:sp>
@@ -11992,8 +11989,8 @@
           </a:ln>
         </p:spPr>
       </p:pic>
-      <mc:AlternateContent xmlns:mc="http://schemas.openxmlformats.org/markup-compatibility/2006">
-        <mc:Choice xmlns:p14="http://schemas.microsoft.com/office/powerpoint/2010/main" Requires="p14">
+      <mc:AlternateContent xmlns:mc="http://schemas.openxmlformats.org/markup-compatibility/2006" xmlns:p14="http://schemas.microsoft.com/office/powerpoint/2010/main">
+        <mc:Choice Requires="p14">
           <p:contentPart p14:bwMode="auto" r:id="rId4">
             <p14:nvContentPartPr>
               <p14:cNvPr id="28" name="Ink 27">
@@ -12012,7 +12009,7 @@
             </p14:xfrm>
           </p:contentPart>
         </mc:Choice>
-        <mc:Fallback>
+        <mc:Fallback xmlns="">
           <p:pic>
             <p:nvPicPr>
               <p:cNvPr id="28" name="Ink 27">
@@ -12043,8 +12040,8 @@
           </p:pic>
         </mc:Fallback>
       </mc:AlternateContent>
-      <mc:AlternateContent xmlns:mc="http://schemas.openxmlformats.org/markup-compatibility/2006">
-        <mc:Choice xmlns:p14="http://schemas.microsoft.com/office/powerpoint/2010/main" Requires="p14">
+      <mc:AlternateContent xmlns:mc="http://schemas.openxmlformats.org/markup-compatibility/2006" xmlns:p14="http://schemas.microsoft.com/office/powerpoint/2010/main">
+        <mc:Choice Requires="p14">
           <p:contentPart p14:bwMode="auto" r:id="rId6">
             <p14:nvContentPartPr>
               <p14:cNvPr id="32" name="Ink 31">
@@ -12063,7 +12060,7 @@
             </p14:xfrm>
           </p:contentPart>
         </mc:Choice>
-        <mc:Fallback>
+        <mc:Fallback xmlns="">
           <p:pic>
             <p:nvPicPr>
               <p:cNvPr id="32" name="Ink 31">
@@ -12094,8 +12091,8 @@
           </p:pic>
         </mc:Fallback>
       </mc:AlternateContent>
-      <mc:AlternateContent xmlns:mc="http://schemas.openxmlformats.org/markup-compatibility/2006">
-        <mc:Choice xmlns:p14="http://schemas.microsoft.com/office/powerpoint/2010/main" Requires="p14">
+      <mc:AlternateContent xmlns:mc="http://schemas.openxmlformats.org/markup-compatibility/2006" xmlns:p14="http://schemas.microsoft.com/office/powerpoint/2010/main">
+        <mc:Choice Requires="p14">
           <p:contentPart p14:bwMode="auto" r:id="rId8">
             <p14:nvContentPartPr>
               <p14:cNvPr id="33" name="Ink 32">
@@ -12114,7 +12111,7 @@
             </p14:xfrm>
           </p:contentPart>
         </mc:Choice>
-        <mc:Fallback>
+        <mc:Fallback xmlns="">
           <p:pic>
             <p:nvPicPr>
               <p:cNvPr id="33" name="Ink 32">
@@ -12145,8 +12142,8 @@
           </p:pic>
         </mc:Fallback>
       </mc:AlternateContent>
-      <mc:AlternateContent xmlns:mc="http://schemas.openxmlformats.org/markup-compatibility/2006">
-        <mc:Choice xmlns:p14="http://schemas.microsoft.com/office/powerpoint/2010/main" Requires="p14">
+      <mc:AlternateContent xmlns:mc="http://schemas.openxmlformats.org/markup-compatibility/2006" xmlns:p14="http://schemas.microsoft.com/office/powerpoint/2010/main">
+        <mc:Choice Requires="p14">
           <p:contentPart p14:bwMode="auto" r:id="rId9">
             <p14:nvContentPartPr>
               <p14:cNvPr id="34" name="Ink 33">
@@ -12165,7 +12162,7 @@
             </p14:xfrm>
           </p:contentPart>
         </mc:Choice>
-        <mc:Fallback>
+        <mc:Fallback xmlns="">
           <p:pic>
             <p:nvPicPr>
               <p:cNvPr id="34" name="Ink 33">
@@ -14942,7 +14939,7 @@
         <p:spPr/>
         <p:txBody>
           <a:bodyPr>
-            <a:normAutofit fontScale="92500"/>
+            <a:normAutofit/>
           </a:bodyPr>
           <a:lstStyle/>
           <a:p>
@@ -15034,47 +15031,6 @@
             <a:r>
               <a:rPr lang="en-US" b="1" u="sng" dirty="0"/>
               <a:t>Overlay the regression line on the line chart.</a:t>
-            </a:r>
-          </a:p>
-          <a:p>
-            <a:pPr marL="0" indent="0">
-              <a:buNone/>
-            </a:pPr>
-            <a:r>
-              <a:rPr lang="en-US" dirty="0"/>
-              <a:t>3. Display the regression function, n, </a:t>
-            </a:r>
-            <a:r>
-              <a:rPr lang="en-US" dirty="0" err="1"/>
-              <a:t>x_sum</a:t>
-            </a:r>
-            <a:r>
-              <a:rPr lang="en-US" dirty="0"/>
-              <a:t>, </a:t>
-            </a:r>
-            <a:r>
-              <a:rPr lang="en-US" dirty="0" err="1"/>
-              <a:t>y_sum</a:t>
-            </a:r>
-            <a:r>
-              <a:rPr lang="en-US" dirty="0"/>
-              <a:t>, </a:t>
-            </a:r>
-            <a:r>
-              <a:rPr lang="en-US" dirty="0" err="1"/>
-              <a:t>xx_sum</a:t>
-            </a:r>
-            <a:r>
-              <a:rPr lang="en-US" dirty="0"/>
-              <a:t>, </a:t>
-            </a:r>
-            <a:r>
-              <a:rPr lang="en-US" dirty="0" err="1"/>
-              <a:t>xy_sum</a:t>
-            </a:r>
-            <a:r>
-              <a:rPr lang="en-US" dirty="0"/>
-              <a:t> on the page. </a:t>
             </a:r>
           </a:p>
         </p:txBody>
@@ -16752,8 +16708,8 @@
           </a:prstGeom>
         </p:spPr>
       </p:pic>
-      <mc:AlternateContent xmlns:mc="http://schemas.openxmlformats.org/markup-compatibility/2006">
-        <mc:Choice xmlns:p14="http://schemas.microsoft.com/office/powerpoint/2010/main" Requires="p14">
+      <mc:AlternateContent xmlns:mc="http://schemas.openxmlformats.org/markup-compatibility/2006" xmlns:p14="http://schemas.microsoft.com/office/powerpoint/2010/main">
+        <mc:Choice Requires="p14">
           <p:contentPart p14:bwMode="auto" r:id="rId3">
             <p14:nvContentPartPr>
               <p14:cNvPr id="8" name="Ink 7">
@@ -16772,7 +16728,7 @@
             </p14:xfrm>
           </p:contentPart>
         </mc:Choice>
-        <mc:Fallback>
+        <mc:Fallback xmlns="">
           <p:pic>
             <p:nvPicPr>
               <p:cNvPr id="8" name="Ink 7">
@@ -16997,8 +16953,8 @@
           </a:prstGeom>
         </p:spPr>
       </p:pic>
-      <mc:AlternateContent xmlns:mc="http://schemas.openxmlformats.org/markup-compatibility/2006">
-        <mc:Choice xmlns:p14="http://schemas.microsoft.com/office/powerpoint/2010/main" Requires="p14">
+      <mc:AlternateContent xmlns:mc="http://schemas.openxmlformats.org/markup-compatibility/2006" xmlns:p14="http://schemas.microsoft.com/office/powerpoint/2010/main">
+        <mc:Choice Requires="p14">
           <p:contentPart p14:bwMode="auto" r:id="rId3">
             <p14:nvContentPartPr>
               <p14:cNvPr id="6" name="Ink 5">
@@ -17017,7 +16973,7 @@
             </p14:xfrm>
           </p:contentPart>
         </mc:Choice>
-        <mc:Fallback>
+        <mc:Fallback xmlns="">
           <p:pic>
             <p:nvPicPr>
               <p:cNvPr id="6" name="Ink 5">

</xml_diff>